<commit_message>
minor adjustments in the Slutrapport
sorry for the extra commit :P
</commit_message>
<xml_diff>
--- a/reports/Slutredovisning/felix slutrapports-del.pptx
+++ b/reports/Slutredovisning/felix slutrapports-del.pptx
@@ -119,7 +119,7 @@
                 </a:uFill>
                 <a:latin typeface="Times New Roman"/>
               </a:rPr>
-              <a:t> </a:t>
+              <a:t>&lt;sidhuvud&gt;</a:t>
             </a:r>
             <a:endParaRPr b="0" lang="sv-SE" sz="1400" spc="-1" strike="noStrike">
               <a:solidFill>
@@ -170,7 +170,7 @@
                 </a:uFill>
                 <a:latin typeface="Times New Roman"/>
               </a:rPr>
-              <a:t> </a:t>
+              <a:t>&lt;datum/tid&gt;</a:t>
             </a:r>
             <a:endParaRPr b="0" lang="sv-SE" sz="1400" spc="-1" strike="noStrike">
               <a:solidFill>
@@ -220,7 +220,7 @@
                 </a:uFill>
                 <a:latin typeface="Times New Roman"/>
               </a:rPr>
-              <a:t> </a:t>
+              <a:t>&lt;sidfot&gt;</a:t>
             </a:r>
             <a:endParaRPr b="0" lang="sv-SE" sz="1400" spc="-1" strike="noStrike">
               <a:solidFill>
@@ -259,7 +259,7 @@
           <a:bodyPr lIns="0" rIns="0" tIns="0" bIns="0" anchor="b"/>
           <a:p>
             <a:pPr algn="r"/>
-            <a:fld id="{0528E99C-B9F0-4D01-9753-B93277E0AA51}" type="slidenum">
+            <a:fld id="{910F836B-553E-4077-A11C-418920F0A9EB}" type="slidenum">
               <a:rPr b="0" lang="sv-SE" sz="1400" spc="-1" strike="noStrike">
                 <a:solidFill>
                   <a:srgbClr val="000000"/>
@@ -271,7 +271,7 @@
                 </a:uFill>
                 <a:latin typeface="Times New Roman"/>
               </a:rPr>
-              <a:t>1</a:t>
+              <a:t>&lt;nummer&gt;</a:t>
             </a:fld>
             <a:endParaRPr b="0" lang="sv-SE" sz="1400" spc="-1" strike="noStrike">
               <a:solidFill>
@@ -323,7 +323,7 @@
         <p:spPr>
           <a:xfrm>
             <a:off x="685800" y="4400640"/>
-            <a:ext cx="5485320" cy="3599280"/>
+            <a:ext cx="5484960" cy="3598920"/>
           </a:xfrm>
           <a:prstGeom prst="rect">
             <a:avLst/>
@@ -332,7 +332,7 @@
         <p:txBody>
           <a:bodyPr lIns="0" rIns="0" tIns="0" bIns="0"/>
           <a:p>
-            <a:pPr marL="216000" indent="-215640">
+            <a:pPr marL="216000" indent="-215280">
               <a:lnSpc>
                 <a:spcPct val="100000"/>
               </a:lnSpc>
@@ -365,7 +365,7 @@
             </a:endParaRPr>
           </a:p>
           <a:p>
-            <a:pPr marL="216000" indent="-215640">
+            <a:pPr marL="216000" indent="-215280">
               <a:lnSpc>
                 <a:spcPct val="100000"/>
               </a:lnSpc>
@@ -393,7 +393,7 @@
         <p:spPr>
           <a:xfrm>
             <a:off x="3884760" y="8685360"/>
-            <a:ext cx="2970720" cy="457560"/>
+            <a:ext cx="2970360" cy="457200"/>
           </a:xfrm>
           <a:prstGeom prst="rect">
             <a:avLst/>
@@ -417,7 +417,7 @@
                 <a:spcPct val="100000"/>
               </a:lnSpc>
             </a:pPr>
-            <a:fld id="{6B6DCCDB-C783-4294-AE95-D531E919E30A}" type="slidenum">
+            <a:fld id="{6EC37D8D-67E9-4939-8BA4-9E498D6B816E}" type="slidenum">
               <a:rPr b="0" lang="sv-SE" sz="1200" spc="-1" strike="noStrike">
                 <a:solidFill>
                   <a:srgbClr val="000000"/>
@@ -430,7 +430,7 @@
                 <a:latin typeface="+mn-lt"/>
                 <a:ea typeface="+mn-ea"/>
               </a:rPr>
-              <a:t>1</a:t>
+              <a:t>&lt;nummer&gt;</a:t>
             </a:fld>
             <a:endParaRPr b="0" lang="sv-SE" sz="1800" spc="-1" strike="noStrike">
               <a:solidFill>
@@ -481,7 +481,7 @@
         <p:spPr>
           <a:xfrm>
             <a:off x="685800" y="4400640"/>
-            <a:ext cx="5485320" cy="3599280"/>
+            <a:ext cx="5484960" cy="3598920"/>
           </a:xfrm>
           <a:prstGeom prst="rect">
             <a:avLst/>
@@ -490,7 +490,7 @@
         <p:txBody>
           <a:bodyPr lIns="0" rIns="0" tIns="0" bIns="0"/>
           <a:p>
-            <a:pPr marL="216000" indent="-215640">
+            <a:pPr marL="216000" indent="-215280">
               <a:lnSpc>
                 <a:spcPct val="100000"/>
               </a:lnSpc>
@@ -523,7 +523,7 @@
             </a:endParaRPr>
           </a:p>
           <a:p>
-            <a:pPr marL="216000" indent="-215640">
+            <a:pPr marL="216000" indent="-215280">
               <a:lnSpc>
                 <a:spcPct val="100000"/>
               </a:lnSpc>
@@ -551,7 +551,7 @@
         <p:spPr>
           <a:xfrm>
             <a:off x="3884760" y="8685360"/>
-            <a:ext cx="2970720" cy="457560"/>
+            <a:ext cx="2970360" cy="457200"/>
           </a:xfrm>
           <a:prstGeom prst="rect">
             <a:avLst/>
@@ -575,7 +575,7 @@
                 <a:spcPct val="100000"/>
               </a:lnSpc>
             </a:pPr>
-            <a:fld id="{DFCC720F-7FAF-49F4-B2A7-4F088C3C9D4C}" type="slidenum">
+            <a:fld id="{9243E8F9-D998-48EB-B5E1-591E2A7DABB0}" type="slidenum">
               <a:rPr b="0" lang="sv-SE" sz="1200" spc="-1" strike="noStrike">
                 <a:solidFill>
                   <a:srgbClr val="000000"/>
@@ -639,7 +639,7 @@
         <p:spPr>
           <a:xfrm>
             <a:off x="685800" y="4400640"/>
-            <a:ext cx="5485320" cy="3599280"/>
+            <a:ext cx="5484960" cy="3598920"/>
           </a:xfrm>
           <a:prstGeom prst="rect">
             <a:avLst/>
@@ -648,7 +648,7 @@
         <p:txBody>
           <a:bodyPr lIns="0" rIns="0" tIns="0" bIns="0"/>
           <a:p>
-            <a:pPr marL="216000" indent="-215640">
+            <a:pPr marL="216000" indent="-215280">
               <a:lnSpc>
                 <a:spcPct val="100000"/>
               </a:lnSpc>
@@ -680,7 +680,7 @@
             </a:endParaRPr>
           </a:p>
           <a:p>
-            <a:pPr marL="216000" indent="-215640">
+            <a:pPr marL="216000" indent="-215280">
               <a:lnSpc>
                 <a:spcPct val="100000"/>
               </a:lnSpc>
@@ -708,7 +708,7 @@
         <p:spPr>
           <a:xfrm>
             <a:off x="3884760" y="8685360"/>
-            <a:ext cx="2970720" cy="457560"/>
+            <a:ext cx="2970360" cy="457200"/>
           </a:xfrm>
           <a:prstGeom prst="rect">
             <a:avLst/>
@@ -732,7 +732,7 @@
                 <a:spcPct val="100000"/>
               </a:lnSpc>
             </a:pPr>
-            <a:fld id="{EF6451E0-E3FB-4645-9296-5093A8AB3778}" type="slidenum">
+            <a:fld id="{8A72D7C7-A983-4100-B406-0E1F05A4FF35}" type="slidenum">
               <a:rPr b="0" lang="sv-SE" sz="1200" spc="-1" strike="noStrike">
                 <a:solidFill>
                   <a:srgbClr val="000000"/>
@@ -4466,7 +4466,7 @@
         <p:spPr>
           <a:xfrm>
             <a:off x="839880" y="365040"/>
-            <a:ext cx="10514520" cy="1324440"/>
+            <a:ext cx="10514160" cy="1324080"/>
           </a:xfrm>
           <a:prstGeom prst="rect">
             <a:avLst/>
@@ -4528,7 +4528,7 @@
         <p:spPr>
           <a:xfrm>
             <a:off x="839880" y="1408680"/>
-            <a:ext cx="3911760" cy="822960"/>
+            <a:ext cx="3911400" cy="822600"/>
           </a:xfrm>
           <a:prstGeom prst="rect">
             <a:avLst/>
@@ -4590,7 +4590,7 @@
         <p:spPr>
           <a:xfrm>
             <a:off x="432000" y="2361600"/>
-            <a:ext cx="4175640" cy="3355920"/>
+            <a:ext cx="4175280" cy="3355560"/>
           </a:xfrm>
           <a:prstGeom prst="rect">
             <a:avLst/>
@@ -4620,6 +4620,7 @@
                   </a:solidFill>
                 </a:uFill>
                 <a:latin typeface="Arial"/>
+                <a:ea typeface="DejaVu Sans"/>
               </a:rPr>
               <a:t>@Before</a:t>
             </a:r>
@@ -4647,6 +4648,7 @@
                   </a:solidFill>
                 </a:uFill>
                 <a:latin typeface="Arial"/>
+                <a:ea typeface="DejaVu Sans"/>
               </a:rPr>
               <a:t>public void before() {</a:t>
             </a:r>
@@ -4674,6 +4676,7 @@
                   </a:solidFill>
                 </a:uFill>
                 <a:latin typeface="Arial"/>
+                <a:ea typeface="DejaVu Sans"/>
               </a:rPr>
               <a:t>    </a:t>
             </a:r>
@@ -4688,6 +4691,7 @@
                   </a:solidFill>
                 </a:uFill>
                 <a:latin typeface="Arial"/>
+                <a:ea typeface="DejaVu Sans"/>
               </a:rPr>
               <a:t>cd = new Cd();</a:t>
             </a:r>
@@ -4728,6 +4732,7 @@
                   </a:solidFill>
                 </a:uFill>
                 <a:latin typeface="Arial"/>
+                <a:ea typeface="DejaVu Sans"/>
               </a:rPr>
               <a:t>    </a:t>
             </a:r>
@@ -4742,6 +4747,7 @@
                   </a:solidFill>
                 </a:uFill>
                 <a:latin typeface="Arial"/>
+                <a:ea typeface="DejaVu Sans"/>
               </a:rPr>
               <a:t>root = new FakeDirectory("root");</a:t>
             </a:r>
@@ -4769,6 +4775,7 @@
                   </a:solidFill>
                 </a:uFill>
                 <a:latin typeface="Arial"/>
+                <a:ea typeface="DejaVu Sans"/>
               </a:rPr>
               <a:t>    </a:t>
             </a:r>
@@ -4783,6 +4790,7 @@
                   </a:solidFill>
                 </a:uFill>
                 <a:latin typeface="Arial"/>
+                <a:ea typeface="DejaVu Sans"/>
               </a:rPr>
               <a:t>fakeAdapter = new FakeFileSystemAdapter();</a:t>
             </a:r>
@@ -4810,6 +4818,7 @@
                   </a:solidFill>
                 </a:uFill>
                 <a:latin typeface="Arial"/>
+                <a:ea typeface="DejaVu Sans"/>
               </a:rPr>
               <a:t>    </a:t>
             </a:r>
@@ -4824,6 +4833,7 @@
                   </a:solidFill>
                 </a:uFill>
                 <a:latin typeface="Arial"/>
+                <a:ea typeface="DejaVu Sans"/>
               </a:rPr>
               <a:t>fakeAdapter.setRoot(root);</a:t>
             </a:r>
@@ -4851,6 +4861,7 @@
                   </a:solidFill>
                 </a:uFill>
                 <a:latin typeface="Arial"/>
+                <a:ea typeface="DejaVu Sans"/>
               </a:rPr>
               <a:t>    </a:t>
             </a:r>
@@ -4865,6 +4876,7 @@
                   </a:solidFill>
                 </a:uFill>
                 <a:latin typeface="Arial"/>
+                <a:ea typeface="DejaVu Sans"/>
               </a:rPr>
               <a:t>Command.setAdapter(fakeAdapter);</a:t>
             </a:r>
@@ -4905,6 +4917,7 @@
                   </a:solidFill>
                 </a:uFill>
                 <a:latin typeface="Arial"/>
+                <a:ea typeface="DejaVu Sans"/>
               </a:rPr>
               <a:t>    </a:t>
             </a:r>
@@ -4919,6 +4932,7 @@
                   </a:solidFill>
                 </a:uFill>
                 <a:latin typeface="Arial"/>
+                <a:ea typeface="DejaVu Sans"/>
               </a:rPr>
               <a:t>//root</a:t>
             </a:r>
@@ -4946,6 +4960,7 @@
                   </a:solidFill>
                 </a:uFill>
                 <a:latin typeface="Arial"/>
+                <a:ea typeface="DejaVu Sans"/>
               </a:rPr>
               <a:t>    </a:t>
             </a:r>
@@ -4960,6 +4975,7 @@
                   </a:solidFill>
                 </a:uFill>
                 <a:latin typeface="Arial"/>
+                <a:ea typeface="DejaVu Sans"/>
               </a:rPr>
               <a:t>currentPath = new Path(Path.DIR_SEPERATOR);</a:t>
             </a:r>
@@ -4987,6 +5003,7 @@
                   </a:solidFill>
                 </a:uFill>
                 <a:latin typeface="Arial"/>
+                <a:ea typeface="DejaVu Sans"/>
               </a:rPr>
               <a:t>}</a:t>
             </a:r>
@@ -5027,6 +5044,7 @@
                   </a:solidFill>
                 </a:uFill>
                 <a:latin typeface="Arial"/>
+                <a:ea typeface="DejaVu Sans"/>
               </a:rPr>
               <a:t>@Test</a:t>
             </a:r>
@@ -5054,6 +5072,7 @@
                   </a:solidFill>
                 </a:uFill>
                 <a:latin typeface="Arial"/>
+                <a:ea typeface="DejaVu Sans"/>
               </a:rPr>
               <a:t>public void doCommand_goToSubfolder(){</a:t>
             </a:r>
@@ -5081,6 +5100,7 @@
                   </a:solidFill>
                 </a:uFill>
                 <a:latin typeface="Arial"/>
+                <a:ea typeface="DejaVu Sans"/>
               </a:rPr>
               <a:t>    </a:t>
             </a:r>
@@ -5095,6 +5115,7 @@
                   </a:solidFill>
                 </a:uFill>
                 <a:latin typeface="Arial"/>
+                <a:ea typeface="DejaVu Sans"/>
               </a:rPr>
               <a:t>FakeDirectory sub = new FakeDirectory("subfolder");</a:t>
             </a:r>
@@ -5122,6 +5143,7 @@
                   </a:solidFill>
                 </a:uFill>
                 <a:latin typeface="Arial"/>
+                <a:ea typeface="DejaVu Sans"/>
               </a:rPr>
               <a:t>    </a:t>
             </a:r>
@@ -5136,6 +5158,7 @@
                   </a:solidFill>
                 </a:uFill>
                 <a:latin typeface="Arial"/>
+                <a:ea typeface="DejaVu Sans"/>
               </a:rPr>
               <a:t>root.addFSO(sub);</a:t>
             </a:r>
@@ -5163,6 +5186,7 @@
                   </a:solidFill>
                 </a:uFill>
                 <a:latin typeface="Arial"/>
+                <a:ea typeface="DejaVu Sans"/>
               </a:rPr>
               <a:t> </a:t>
             </a:r>
@@ -5190,6 +5214,7 @@
                   </a:solidFill>
                 </a:uFill>
                 <a:latin typeface="Arial"/>
+                <a:ea typeface="DejaVu Sans"/>
               </a:rPr>
               <a:t>    </a:t>
             </a:r>
@@ -5204,6 +5229,7 @@
                   </a:solidFill>
                 </a:uFill>
                 <a:latin typeface="Arial"/>
+                <a:ea typeface="DejaVu Sans"/>
               </a:rPr>
               <a:t>cd.doCommand(currentPath, "subfolder");</a:t>
             </a:r>
@@ -5231,6 +5257,7 @@
                   </a:solidFill>
                 </a:uFill>
                 <a:latin typeface="Arial"/>
+                <a:ea typeface="DejaVu Sans"/>
               </a:rPr>
               <a:t>    </a:t>
             </a:r>
@@ -5245,6 +5272,7 @@
                   </a:solidFill>
                 </a:uFill>
                 <a:latin typeface="Arial"/>
+                <a:ea typeface="DejaVu Sans"/>
               </a:rPr>
               <a:t>assertEquals("/subfolder", currentPath.getPath());          </a:t>
             </a:r>
@@ -5272,6 +5300,7 @@
                   </a:solidFill>
                 </a:uFill>
                 <a:latin typeface="Arial"/>
+                <a:ea typeface="DejaVu Sans"/>
               </a:rPr>
               <a:t>}</a:t>
             </a:r>
@@ -5298,7 +5327,7 @@
         <p:spPr>
           <a:xfrm>
             <a:off x="839880" y="2505240"/>
-            <a:ext cx="5156640" cy="3683520"/>
+            <a:ext cx="5156280" cy="3683160"/>
           </a:xfrm>
           <a:prstGeom prst="rect">
             <a:avLst/>
@@ -5324,7 +5353,7 @@
         <p:spPr>
           <a:xfrm>
             <a:off x="6172200" y="1408680"/>
-            <a:ext cx="5182200" cy="822960"/>
+            <a:ext cx="5181840" cy="822600"/>
           </a:xfrm>
           <a:prstGeom prst="rect">
             <a:avLst/>
@@ -5386,7 +5415,7 @@
         <p:spPr>
           <a:xfrm>
             <a:off x="6172200" y="2505240"/>
-            <a:ext cx="5182200" cy="3683520"/>
+            <a:ext cx="5181840" cy="3683160"/>
           </a:xfrm>
           <a:prstGeom prst="rect">
             <a:avLst/>
@@ -5412,7 +5441,7 @@
         <p:spPr>
           <a:xfrm>
             <a:off x="5760000" y="2232000"/>
-            <a:ext cx="6119640" cy="4356000"/>
+            <a:ext cx="6119280" cy="4355640"/>
           </a:xfrm>
           <a:prstGeom prst="rect">
             <a:avLst/>
@@ -5442,6 +5471,7 @@
                   </a:solidFill>
                 </a:uFill>
                 <a:latin typeface="Arial"/>
+                <a:ea typeface="DejaVu Sans"/>
               </a:rPr>
               <a:t>package prompt.command;</a:t>
             </a:r>
@@ -5482,6 +5512,7 @@
                   </a:solidFill>
                 </a:uFill>
                 <a:latin typeface="Arial"/>
+                <a:ea typeface="DejaVu Sans"/>
               </a:rPr>
               <a:t>import prompt.util.Path;</a:t>
             </a:r>
@@ -5522,6 +5553,7 @@
                   </a:solidFill>
                 </a:uFill>
                 <a:latin typeface="Arial"/>
+                <a:ea typeface="DejaVu Sans"/>
               </a:rPr>
               <a:t>public class Cd extends Command {</a:t>
             </a:r>
@@ -5562,6 +5594,7 @@
                   </a:solidFill>
                 </a:uFill>
                 <a:latin typeface="Arial"/>
+                <a:ea typeface="DejaVu Sans"/>
               </a:rPr>
               <a:t>    </a:t>
             </a:r>
@@ -5576,6 +5609,7 @@
                   </a:solidFill>
                 </a:uFill>
                 <a:latin typeface="Arial"/>
+                <a:ea typeface="DejaVu Sans"/>
               </a:rPr>
               <a:t>public String doCommand(Path currentPath, String input) {</a:t>
             </a:r>
@@ -5603,6 +5637,7 @@
                   </a:solidFill>
                 </a:uFill>
                 <a:latin typeface="Arial"/>
+                <a:ea typeface="DejaVu Sans"/>
               </a:rPr>
               <a:t>        </a:t>
             </a:r>
@@ -5617,6 +5652,7 @@
                   </a:solidFill>
                 </a:uFill>
                 <a:latin typeface="Arial"/>
+                <a:ea typeface="DejaVu Sans"/>
               </a:rPr>
               <a:t>if(!input.startsWith(Path.DIR_SEPERATOR)){</a:t>
             </a:r>
@@ -5644,6 +5680,7 @@
                   </a:solidFill>
                 </a:uFill>
                 <a:latin typeface="Arial"/>
+                <a:ea typeface="DejaVu Sans"/>
               </a:rPr>
               <a:t>            </a:t>
             </a:r>
@@ -5658,6 +5695,7 @@
                   </a:solidFill>
                 </a:uFill>
                 <a:latin typeface="Arial"/>
+                <a:ea typeface="DejaVu Sans"/>
               </a:rPr>
               <a:t>String</a:t>
             </a:r>
@@ -5685,6 +5723,7 @@
                   </a:solidFill>
                 </a:uFill>
                 <a:latin typeface="Arial"/>
+                <a:ea typeface="DejaVu Sans"/>
               </a:rPr>
               <a:t>            </a:t>
             </a:r>
@@ -5699,6 +5738,7 @@
                   </a:solidFill>
                 </a:uFill>
                 <a:latin typeface="Arial"/>
+                <a:ea typeface="DejaVu Sans"/>
               </a:rPr>
               <a:t>currentPath.setPath(input);</a:t>
             </a:r>
@@ -5726,6 +5766,7 @@
                   </a:solidFill>
                 </a:uFill>
                 <a:latin typeface="Arial"/>
+                <a:ea typeface="DejaVu Sans"/>
               </a:rPr>
               <a:t>        </a:t>
             </a:r>
@@ -5740,6 +5781,7 @@
                   </a:solidFill>
                 </a:uFill>
                 <a:latin typeface="Arial"/>
+                <a:ea typeface="DejaVu Sans"/>
               </a:rPr>
               <a:t>}</a:t>
             </a:r>
@@ -5767,6 +5809,7 @@
                   </a:solidFill>
                 </a:uFill>
                 <a:latin typeface="Arial"/>
+                <a:ea typeface="DejaVu Sans"/>
               </a:rPr>
               <a:t>        </a:t>
             </a:r>
@@ -5781,6 +5824,7 @@
                   </a:solidFill>
                 </a:uFill>
                 <a:latin typeface="Arial"/>
+                <a:ea typeface="DejaVu Sans"/>
               </a:rPr>
               <a:t>return "";</a:t>
             </a:r>
@@ -5821,6 +5865,7 @@
                   </a:solidFill>
                 </a:uFill>
                 <a:latin typeface="Arial"/>
+                <a:ea typeface="DejaVu Sans"/>
               </a:rPr>
               <a:t>    </a:t>
             </a:r>
@@ -5835,6 +5880,7 @@
                   </a:solidFill>
                 </a:uFill>
                 <a:latin typeface="Arial"/>
+                <a:ea typeface="DejaVu Sans"/>
               </a:rPr>
               <a:t>}</a:t>
             </a:r>
@@ -5862,6 +5908,7 @@
                   </a:solidFill>
                 </a:uFill>
                 <a:latin typeface="Arial"/>
+                <a:ea typeface="DejaVu Sans"/>
               </a:rPr>
               <a:t>}</a:t>
             </a:r>
@@ -5888,7 +5935,7 @@
         <p:spPr>
           <a:xfrm>
             <a:off x="0" y="6480000"/>
-            <a:ext cx="9243360" cy="369360"/>
+            <a:ext cx="9243000" cy="369000"/>
           </a:xfrm>
           <a:prstGeom prst="rect">
             <a:avLst/>
@@ -5918,6 +5965,7 @@
                   </a:solidFill>
                 </a:uFill>
                 <a:latin typeface="Arial"/>
+                <a:ea typeface="DejaVu Sans"/>
               </a:rPr>
               <a:t>https://github.com/Pontussand/INTE2016Project/commit/9f6a225578252b20aaa75f9943aa70cfa0e495f2</a:t>
             </a:r>
@@ -5993,7 +6041,7 @@
         <p:spPr>
           <a:xfrm>
             <a:off x="648000" y="-72000"/>
-            <a:ext cx="4679640" cy="647640"/>
+            <a:ext cx="4679280" cy="647280"/>
           </a:xfrm>
           <a:prstGeom prst="rect">
             <a:avLst/>
@@ -6055,7 +6103,7 @@
         <p:spPr>
           <a:xfrm>
             <a:off x="864000" y="432000"/>
-            <a:ext cx="1655640" cy="503640"/>
+            <a:ext cx="1655280" cy="503280"/>
           </a:xfrm>
           <a:prstGeom prst="rect">
             <a:avLst/>
@@ -6116,8 +6164,8 @@
         </p:nvSpPr>
         <p:spPr>
           <a:xfrm>
-            <a:off x="349560" y="1152000"/>
-            <a:ext cx="4186080" cy="5327640"/>
+            <a:off x="349560" y="1008000"/>
+            <a:ext cx="4185720" cy="5327280"/>
           </a:xfrm>
           <a:prstGeom prst="rect">
             <a:avLst/>
@@ -6147,10 +6195,11 @@
                   </a:solidFill>
                 </a:uFill>
                 <a:latin typeface="Arial"/>
+                <a:ea typeface="DejaVu Sans"/>
               </a:rPr>
               <a:t>@Before</a:t>
             </a:r>
-            <a:endParaRPr b="0" lang="sv-SE" sz="1800" spc="-1" strike="noStrike">
+            <a:endParaRPr b="0" lang="sv-SE" sz="1100" spc="-1" strike="noStrike">
               <a:solidFill>
                 <a:srgbClr val="000000"/>
               </a:solidFill>
@@ -6174,10 +6223,11 @@
                   </a:solidFill>
                 </a:uFill>
                 <a:latin typeface="Arial"/>
+                <a:ea typeface="DejaVu Sans"/>
               </a:rPr>
               <a:t>public void before() {</a:t>
             </a:r>
-            <a:endParaRPr b="0" lang="sv-SE" sz="1800" spc="-1" strike="noStrike">
+            <a:endParaRPr b="0" lang="sv-SE" sz="1100" spc="-1" strike="noStrike">
               <a:solidFill>
                 <a:srgbClr val="000000"/>
               </a:solidFill>
@@ -6201,6 +6251,7 @@
                   </a:solidFill>
                 </a:uFill>
                 <a:latin typeface="Arial"/>
+                <a:ea typeface="DejaVu Sans"/>
               </a:rPr>
               <a:t>   </a:t>
             </a:r>
@@ -6215,6 +6266,7 @@
                   </a:solidFill>
                 </a:uFill>
                 <a:latin typeface="Arial"/>
+                <a:ea typeface="DejaVu Sans"/>
               </a:rPr>
               <a:t> </a:t>
             </a:r>
@@ -6229,6 +6281,7 @@
                   </a:solidFill>
                 </a:uFill>
                 <a:latin typeface="Arial"/>
+                <a:ea typeface="DejaVu Sans"/>
               </a:rPr>
               <a:t>…</a:t>
             </a:r>
@@ -6243,10 +6296,11 @@
                   </a:solidFill>
                 </a:uFill>
                 <a:latin typeface="Arial"/>
+                <a:ea typeface="DejaVu Sans"/>
               </a:rPr>
               <a:t> </a:t>
             </a:r>
-            <a:endParaRPr b="0" lang="sv-SE" sz="1800" spc="-1" strike="noStrike">
+            <a:endParaRPr b="0" lang="sv-SE" sz="1100" spc="-1" strike="noStrike">
               <a:solidFill>
                 <a:srgbClr val="000000"/>
               </a:solidFill>
@@ -6270,6 +6324,7 @@
                   </a:solidFill>
                 </a:uFill>
                 <a:latin typeface="Arial"/>
+                <a:ea typeface="DejaVu Sans"/>
               </a:rPr>
               <a:t>    </a:t>
             </a:r>
@@ -6284,10 +6339,11 @@
                   </a:solidFill>
                 </a:uFill>
                 <a:latin typeface="Arial"/>
+                <a:ea typeface="DejaVu Sans"/>
               </a:rPr>
               <a:t>//root</a:t>
             </a:r>
-            <a:endParaRPr b="0" lang="sv-SE" sz="1800" spc="-1" strike="noStrike">
+            <a:endParaRPr b="0" lang="sv-SE" sz="1100" spc="-1" strike="noStrike">
               <a:solidFill>
                 <a:srgbClr val="000000"/>
               </a:solidFill>
@@ -6311,6 +6367,7 @@
                   </a:solidFill>
                 </a:uFill>
                 <a:latin typeface="Arial"/>
+                <a:ea typeface="DejaVu Sans"/>
               </a:rPr>
               <a:t>    </a:t>
             </a:r>
@@ -6325,10 +6382,11 @@
                   </a:solidFill>
                 </a:uFill>
                 <a:latin typeface="Arial"/>
+                <a:ea typeface="DejaVu Sans"/>
               </a:rPr>
               <a:t>currentPath = new Path("");</a:t>
             </a:r>
-            <a:endParaRPr b="0" lang="sv-SE" sz="1800" spc="-1" strike="noStrike">
+            <a:endParaRPr b="0" lang="sv-SE" sz="1100" spc="-1" strike="noStrike">
               <a:solidFill>
                 <a:srgbClr val="000000"/>
               </a:solidFill>
@@ -6352,23 +6410,24 @@
                   </a:solidFill>
                 </a:uFill>
                 <a:latin typeface="Arial"/>
+                <a:ea typeface="DejaVu Sans"/>
               </a:rPr>
               <a:t>}</a:t>
             </a:r>
-            <a:endParaRPr b="0" lang="sv-SE" sz="1800" spc="-1" strike="noStrike">
-              <a:solidFill>
-                <a:srgbClr val="000000"/>
-              </a:solidFill>
-              <a:uFill>
-                <a:solidFill>
-                  <a:srgbClr val="ffffff"/>
-                </a:solidFill>
-              </a:uFill>
-              <a:latin typeface="Arial"/>
-            </a:endParaRPr>
-          </a:p>
-          <a:p>
-            <a:endParaRPr b="0" lang="sv-SE" sz="1800" spc="-1" strike="noStrike">
+            <a:endParaRPr b="0" lang="sv-SE" sz="1100" spc="-1" strike="noStrike">
+              <a:solidFill>
+                <a:srgbClr val="000000"/>
+              </a:solidFill>
+              <a:uFill>
+                <a:solidFill>
+                  <a:srgbClr val="ffffff"/>
+                </a:solidFill>
+              </a:uFill>
+              <a:latin typeface="Arial"/>
+            </a:endParaRPr>
+          </a:p>
+          <a:p>
+            <a:endParaRPr b="0" lang="sv-SE" sz="1100" spc="-1" strike="noStrike">
               <a:solidFill>
                 <a:srgbClr val="000000"/>
               </a:solidFill>
@@ -6392,10 +6451,11 @@
                   </a:solidFill>
                 </a:uFill>
                 <a:latin typeface="Arial"/>
+                <a:ea typeface="DejaVu Sans"/>
               </a:rPr>
               <a:t>@Test</a:t>
             </a:r>
-            <a:endParaRPr b="0" lang="sv-SE" sz="1800" spc="-1" strike="noStrike">
+            <a:endParaRPr b="0" lang="sv-SE" sz="1100" spc="-1" strike="noStrike">
               <a:solidFill>
                 <a:srgbClr val="000000"/>
               </a:solidFill>
@@ -6419,10 +6479,11 @@
                   </a:solidFill>
                 </a:uFill>
                 <a:latin typeface="Arial"/>
+                <a:ea typeface="DejaVu Sans"/>
               </a:rPr>
               <a:t>public void doCommand_goToSubfolder(){</a:t>
             </a:r>
-            <a:endParaRPr b="0" lang="sv-SE" sz="1800" spc="-1" strike="noStrike">
+            <a:endParaRPr b="0" lang="sv-SE" sz="1100" spc="-1" strike="noStrike">
               <a:solidFill>
                 <a:srgbClr val="000000"/>
               </a:solidFill>
@@ -6446,6 +6507,7 @@
                   </a:solidFill>
                 </a:uFill>
                 <a:latin typeface="Arial"/>
+                <a:ea typeface="DejaVu Sans"/>
               </a:rPr>
               <a:t>    </a:t>
             </a:r>
@@ -6460,10 +6522,11 @@
                   </a:solidFill>
                 </a:uFill>
                 <a:latin typeface="Arial"/>
+                <a:ea typeface="DejaVu Sans"/>
               </a:rPr>
               <a:t>FakeDirectory sub = new FakeDirectory("subfolder");</a:t>
             </a:r>
-            <a:endParaRPr b="0" lang="sv-SE" sz="1800" spc="-1" strike="noStrike">
+            <a:endParaRPr b="0" lang="sv-SE" sz="1100" spc="-1" strike="noStrike">
               <a:solidFill>
                 <a:srgbClr val="000000"/>
               </a:solidFill>
@@ -6487,6 +6550,7 @@
                   </a:solidFill>
                 </a:uFill>
                 <a:latin typeface="Arial"/>
+                <a:ea typeface="DejaVu Sans"/>
               </a:rPr>
               <a:t>    </a:t>
             </a:r>
@@ -6501,23 +6565,24 @@
                   </a:solidFill>
                 </a:uFill>
                 <a:latin typeface="Arial"/>
+                <a:ea typeface="DejaVu Sans"/>
               </a:rPr>
               <a:t>root.addFSO(sub);</a:t>
             </a:r>
-            <a:endParaRPr b="0" lang="sv-SE" sz="1800" spc="-1" strike="noStrike">
-              <a:solidFill>
-                <a:srgbClr val="000000"/>
-              </a:solidFill>
-              <a:uFill>
-                <a:solidFill>
-                  <a:srgbClr val="ffffff"/>
-                </a:solidFill>
-              </a:uFill>
-              <a:latin typeface="Arial"/>
-            </a:endParaRPr>
-          </a:p>
-          <a:p>
-            <a:endParaRPr b="0" lang="sv-SE" sz="1800" spc="-1" strike="noStrike">
+            <a:endParaRPr b="0" lang="sv-SE" sz="1100" spc="-1" strike="noStrike">
+              <a:solidFill>
+                <a:srgbClr val="000000"/>
+              </a:solidFill>
+              <a:uFill>
+                <a:solidFill>
+                  <a:srgbClr val="ffffff"/>
+                </a:solidFill>
+              </a:uFill>
+              <a:latin typeface="Arial"/>
+            </a:endParaRPr>
+          </a:p>
+          <a:p>
+            <a:endParaRPr b="0" lang="sv-SE" sz="1100" spc="-1" strike="noStrike">
               <a:solidFill>
                 <a:srgbClr val="000000"/>
               </a:solidFill>
@@ -6541,6 +6606,7 @@
                   </a:solidFill>
                 </a:uFill>
                 <a:latin typeface="Arial"/>
+                <a:ea typeface="DejaVu Sans"/>
               </a:rPr>
               <a:t>    </a:t>
             </a:r>
@@ -6555,10 +6621,11 @@
                   </a:solidFill>
                 </a:uFill>
                 <a:latin typeface="Arial"/>
+                <a:ea typeface="DejaVu Sans"/>
               </a:rPr>
               <a:t>String ret = cd.doCommand(currentPath, "subfolder");</a:t>
             </a:r>
-            <a:endParaRPr b="0" lang="sv-SE" sz="1800" spc="-1" strike="noStrike">
+            <a:endParaRPr b="0" lang="sv-SE" sz="1100" spc="-1" strike="noStrike">
               <a:solidFill>
                 <a:srgbClr val="000000"/>
               </a:solidFill>
@@ -6582,6 +6649,7 @@
                   </a:solidFill>
                 </a:uFill>
                 <a:latin typeface="Arial"/>
+                <a:ea typeface="DejaVu Sans"/>
               </a:rPr>
               <a:t>    </a:t>
             </a:r>
@@ -6596,10 +6664,11 @@
                   </a:solidFill>
                 </a:uFill>
                 <a:latin typeface="Arial"/>
+                <a:ea typeface="DejaVu Sans"/>
               </a:rPr>
               <a:t>assertEquals("", ret);</a:t>
             </a:r>
-            <a:endParaRPr b="0" lang="sv-SE" sz="1800" spc="-1" strike="noStrike">
+            <a:endParaRPr b="0" lang="sv-SE" sz="1100" spc="-1" strike="noStrike">
               <a:solidFill>
                 <a:srgbClr val="000000"/>
               </a:solidFill>
@@ -6623,6 +6692,7 @@
                   </a:solidFill>
                 </a:uFill>
                 <a:latin typeface="Arial"/>
+                <a:ea typeface="DejaVu Sans"/>
               </a:rPr>
               <a:t>    </a:t>
             </a:r>
@@ -6637,10 +6707,11 @@
                   </a:solidFill>
                 </a:uFill>
                 <a:latin typeface="Arial"/>
+                <a:ea typeface="DejaVu Sans"/>
               </a:rPr>
               <a:t>assertEquals("/subfolder", currentPath.getPath());</a:t>
             </a:r>
-            <a:endParaRPr b="0" lang="sv-SE" sz="1800" spc="-1" strike="noStrike">
+            <a:endParaRPr b="0" lang="sv-SE" sz="1100" spc="-1" strike="noStrike">
               <a:solidFill>
                 <a:srgbClr val="000000"/>
               </a:solidFill>
@@ -6664,23 +6735,24 @@
                   </a:solidFill>
                 </a:uFill>
                 <a:latin typeface="Arial"/>
+                <a:ea typeface="DejaVu Sans"/>
               </a:rPr>
               <a:t>}</a:t>
             </a:r>
-            <a:endParaRPr b="0" lang="sv-SE" sz="1800" spc="-1" strike="noStrike">
-              <a:solidFill>
-                <a:srgbClr val="000000"/>
-              </a:solidFill>
-              <a:uFill>
-                <a:solidFill>
-                  <a:srgbClr val="ffffff"/>
-                </a:solidFill>
-              </a:uFill>
-              <a:latin typeface="Arial"/>
-            </a:endParaRPr>
-          </a:p>
-          <a:p>
-            <a:endParaRPr b="0" lang="sv-SE" sz="1800" spc="-1" strike="noStrike">
+            <a:endParaRPr b="0" lang="sv-SE" sz="1100" spc="-1" strike="noStrike">
+              <a:solidFill>
+                <a:srgbClr val="000000"/>
+              </a:solidFill>
+              <a:uFill>
+                <a:solidFill>
+                  <a:srgbClr val="ffffff"/>
+                </a:solidFill>
+              </a:uFill>
+              <a:latin typeface="Arial"/>
+            </a:endParaRPr>
+          </a:p>
+          <a:p>
+            <a:endParaRPr b="0" lang="sv-SE" sz="1100" spc="-1" strike="noStrike">
               <a:solidFill>
                 <a:srgbClr val="000000"/>
               </a:solidFill>
@@ -6704,10 +6776,11 @@
                   </a:solidFill>
                 </a:uFill>
                 <a:latin typeface="Arial"/>
+                <a:ea typeface="DejaVu Sans"/>
               </a:rPr>
               <a:t>@Test</a:t>
             </a:r>
-            <a:endParaRPr b="0" lang="sv-SE" sz="1800" spc="-1" strike="noStrike">
+            <a:endParaRPr b="0" lang="sv-SE" sz="1100" spc="-1" strike="noStrike">
               <a:solidFill>
                 <a:srgbClr val="000000"/>
               </a:solidFill>
@@ -6731,10 +6804,11 @@
                   </a:solidFill>
                 </a:uFill>
                 <a:latin typeface="Arial"/>
+                <a:ea typeface="DejaVu Sans"/>
               </a:rPr>
               <a:t>public void doCommand_goToNonExistantSubFolder(){</a:t>
             </a:r>
-            <a:endParaRPr b="0" lang="sv-SE" sz="1800" spc="-1" strike="noStrike">
+            <a:endParaRPr b="0" lang="sv-SE" sz="1100" spc="-1" strike="noStrike">
               <a:solidFill>
                 <a:srgbClr val="000000"/>
               </a:solidFill>
@@ -6758,6 +6832,7 @@
                   </a:solidFill>
                 </a:uFill>
                 <a:latin typeface="Arial"/>
+                <a:ea typeface="DejaVu Sans"/>
               </a:rPr>
               <a:t>    </a:t>
             </a:r>
@@ -6772,10 +6847,11 @@
                   </a:solidFill>
                 </a:uFill>
                 <a:latin typeface="Arial"/>
+                <a:ea typeface="DejaVu Sans"/>
               </a:rPr>
               <a:t>String ret = cd.doCommand(currentPath, "Should not exist");</a:t>
             </a:r>
-            <a:endParaRPr b="0" lang="sv-SE" sz="1800" spc="-1" strike="noStrike">
+            <a:endParaRPr b="0" lang="sv-SE" sz="1100" spc="-1" strike="noStrike">
               <a:solidFill>
                 <a:srgbClr val="000000"/>
               </a:solidFill>
@@ -6799,6 +6875,7 @@
                   </a:solidFill>
                 </a:uFill>
                 <a:latin typeface="Arial"/>
+                <a:ea typeface="DejaVu Sans"/>
               </a:rPr>
               <a:t>    </a:t>
             </a:r>
@@ -6813,10 +6890,11 @@
                   </a:solidFill>
                 </a:uFill>
                 <a:latin typeface="Arial"/>
+                <a:ea typeface="DejaVu Sans"/>
               </a:rPr>
               <a:t>assertEquals(Cd.NO_SUCH_DIR_MSG, ret);</a:t>
             </a:r>
-            <a:endParaRPr b="0" lang="sv-SE" sz="1800" spc="-1" strike="noStrike">
+            <a:endParaRPr b="0" lang="sv-SE" sz="1100" spc="-1" strike="noStrike">
               <a:solidFill>
                 <a:srgbClr val="000000"/>
               </a:solidFill>
@@ -6840,6 +6918,7 @@
                   </a:solidFill>
                 </a:uFill>
                 <a:latin typeface="Arial"/>
+                <a:ea typeface="DejaVu Sans"/>
               </a:rPr>
               <a:t>    </a:t>
             </a:r>
@@ -6854,10 +6933,11 @@
                   </a:solidFill>
                 </a:uFill>
                 <a:latin typeface="Arial"/>
+                <a:ea typeface="DejaVu Sans"/>
               </a:rPr>
               <a:t>assertEquals("", currentPath.getPath());</a:t>
             </a:r>
-            <a:endParaRPr b="0" lang="sv-SE" sz="1800" spc="-1" strike="noStrike">
+            <a:endParaRPr b="0" lang="sv-SE" sz="1100" spc="-1" strike="noStrike">
               <a:solidFill>
                 <a:srgbClr val="000000"/>
               </a:solidFill>
@@ -6881,23 +6961,24 @@
                   </a:solidFill>
                 </a:uFill>
                 <a:latin typeface="Arial"/>
+                <a:ea typeface="DejaVu Sans"/>
               </a:rPr>
               <a:t>}</a:t>
             </a:r>
-            <a:endParaRPr b="0" lang="sv-SE" sz="1800" spc="-1" strike="noStrike">
-              <a:solidFill>
-                <a:srgbClr val="000000"/>
-              </a:solidFill>
-              <a:uFill>
-                <a:solidFill>
-                  <a:srgbClr val="ffffff"/>
-                </a:solidFill>
-              </a:uFill>
-              <a:latin typeface="Arial"/>
-            </a:endParaRPr>
-          </a:p>
-          <a:p>
-            <a:endParaRPr b="0" lang="sv-SE" sz="1800" spc="-1" strike="noStrike">
+            <a:endParaRPr b="0" lang="sv-SE" sz="1100" spc="-1" strike="noStrike">
+              <a:solidFill>
+                <a:srgbClr val="000000"/>
+              </a:solidFill>
+              <a:uFill>
+                <a:solidFill>
+                  <a:srgbClr val="ffffff"/>
+                </a:solidFill>
+              </a:uFill>
+              <a:latin typeface="Arial"/>
+            </a:endParaRPr>
+          </a:p>
+          <a:p>
+            <a:endParaRPr b="0" lang="sv-SE" sz="1100" spc="-1" strike="noStrike">
               <a:solidFill>
                 <a:srgbClr val="000000"/>
               </a:solidFill>
@@ -6921,10 +7002,11 @@
                   </a:solidFill>
                 </a:uFill>
                 <a:latin typeface="Arial"/>
+                <a:ea typeface="DejaVu Sans"/>
               </a:rPr>
               <a:t>@Test</a:t>
             </a:r>
-            <a:endParaRPr b="0" lang="sv-SE" sz="1800" spc="-1" strike="noStrike">
+            <a:endParaRPr b="0" lang="sv-SE" sz="1100" spc="-1" strike="noStrike">
               <a:solidFill>
                 <a:srgbClr val="000000"/>
               </a:solidFill>
@@ -6948,6 +7030,7 @@
                   </a:solidFill>
                 </a:uFill>
                 <a:latin typeface="Arial"/>
+                <a:ea typeface="DejaVu Sans"/>
               </a:rPr>
               <a:t>public void doCommand_goFromRoot(){ </a:t>
             </a:r>
@@ -6962,6 +7045,7 @@
                   </a:solidFill>
                 </a:uFill>
                 <a:latin typeface="Arial"/>
+                <a:ea typeface="DejaVu Sans"/>
               </a:rPr>
               <a:t>…</a:t>
             </a:r>
@@ -6976,23 +7060,24 @@
                   </a:solidFill>
                 </a:uFill>
                 <a:latin typeface="Arial"/>
+                <a:ea typeface="DejaVu Sans"/>
               </a:rPr>
               <a:t> }</a:t>
             </a:r>
-            <a:endParaRPr b="0" lang="sv-SE" sz="1800" spc="-1" strike="noStrike">
-              <a:solidFill>
-                <a:srgbClr val="000000"/>
-              </a:solidFill>
-              <a:uFill>
-                <a:solidFill>
-                  <a:srgbClr val="ffffff"/>
-                </a:solidFill>
-              </a:uFill>
-              <a:latin typeface="Arial"/>
-            </a:endParaRPr>
-          </a:p>
-          <a:p>
-            <a:endParaRPr b="0" lang="sv-SE" sz="1800" spc="-1" strike="noStrike">
+            <a:endParaRPr b="0" lang="sv-SE" sz="1100" spc="-1" strike="noStrike">
+              <a:solidFill>
+                <a:srgbClr val="000000"/>
+              </a:solidFill>
+              <a:uFill>
+                <a:solidFill>
+                  <a:srgbClr val="ffffff"/>
+                </a:solidFill>
+              </a:uFill>
+              <a:latin typeface="Arial"/>
+            </a:endParaRPr>
+          </a:p>
+          <a:p>
+            <a:endParaRPr b="0" lang="sv-SE" sz="1100" spc="-1" strike="noStrike">
               <a:solidFill>
                 <a:srgbClr val="000000"/>
               </a:solidFill>
@@ -7016,10 +7101,11 @@
                   </a:solidFill>
                 </a:uFill>
                 <a:latin typeface="Arial"/>
+                <a:ea typeface="DejaVu Sans"/>
               </a:rPr>
               <a:t>@Test</a:t>
             </a:r>
-            <a:endParaRPr b="0" lang="sv-SE" sz="1800" spc="-1" strike="noStrike">
+            <a:endParaRPr b="0" lang="sv-SE" sz="1100" spc="-1" strike="noStrike">
               <a:solidFill>
                 <a:srgbClr val="000000"/>
               </a:solidFill>
@@ -7043,6 +7129,7 @@
                   </a:solidFill>
                 </a:uFill>
                 <a:latin typeface="Arial"/>
+                <a:ea typeface="DejaVu Sans"/>
               </a:rPr>
               <a:t>public void doCommand_goBackOneDir(){ </a:t>
             </a:r>
@@ -7057,6 +7144,7 @@
                   </a:solidFill>
                 </a:uFill>
                 <a:latin typeface="Arial"/>
+                <a:ea typeface="DejaVu Sans"/>
               </a:rPr>
               <a:t>…</a:t>
             </a:r>
@@ -7071,23 +7159,24 @@
                   </a:solidFill>
                 </a:uFill>
                 <a:latin typeface="Arial"/>
+                <a:ea typeface="DejaVu Sans"/>
               </a:rPr>
               <a:t> }</a:t>
             </a:r>
-            <a:endParaRPr b="0" lang="sv-SE" sz="1800" spc="-1" strike="noStrike">
-              <a:solidFill>
-                <a:srgbClr val="000000"/>
-              </a:solidFill>
-              <a:uFill>
-                <a:solidFill>
-                  <a:srgbClr val="ffffff"/>
-                </a:solidFill>
-              </a:uFill>
-              <a:latin typeface="Arial"/>
-            </a:endParaRPr>
-          </a:p>
-          <a:p>
-            <a:endParaRPr b="0" lang="sv-SE" sz="1800" spc="-1" strike="noStrike">
+            <a:endParaRPr b="0" lang="sv-SE" sz="1100" spc="-1" strike="noStrike">
+              <a:solidFill>
+                <a:srgbClr val="000000"/>
+              </a:solidFill>
+              <a:uFill>
+                <a:solidFill>
+                  <a:srgbClr val="ffffff"/>
+                </a:solidFill>
+              </a:uFill>
+              <a:latin typeface="Arial"/>
+            </a:endParaRPr>
+          </a:p>
+          <a:p>
+            <a:endParaRPr b="0" lang="sv-SE" sz="1100" spc="-1" strike="noStrike">
               <a:solidFill>
                 <a:srgbClr val="000000"/>
               </a:solidFill>
@@ -7111,10 +7200,11 @@
                   </a:solidFill>
                 </a:uFill>
                 <a:latin typeface="Arial"/>
+                <a:ea typeface="DejaVu Sans"/>
               </a:rPr>
               <a:t>@Test</a:t>
             </a:r>
-            <a:endParaRPr b="0" lang="sv-SE" sz="1800" spc="-1" strike="noStrike">
+            <a:endParaRPr b="0" lang="sv-SE" sz="1100" spc="-1" strike="noStrike">
               <a:solidFill>
                 <a:srgbClr val="000000"/>
               </a:solidFill>
@@ -7138,6 +7228,7 @@
                   </a:solidFill>
                 </a:uFill>
                 <a:latin typeface="Arial"/>
+                <a:ea typeface="DejaVu Sans"/>
               </a:rPr>
               <a:t>public void doCommand_goToRoot(){ </a:t>
             </a:r>
@@ -7152,6 +7243,7 @@
                   </a:solidFill>
                 </a:uFill>
                 <a:latin typeface="Arial"/>
+                <a:ea typeface="DejaVu Sans"/>
               </a:rPr>
               <a:t>…</a:t>
             </a:r>
@@ -7166,10 +7258,11 @@
                   </a:solidFill>
                 </a:uFill>
                 <a:latin typeface="Arial"/>
+                <a:ea typeface="DejaVu Sans"/>
               </a:rPr>
               <a:t> }</a:t>
             </a:r>
-            <a:endParaRPr b="0" lang="sv-SE" sz="1800" spc="-1" strike="noStrike">
+            <a:endParaRPr b="0" lang="sv-SE" sz="1100" spc="-1" strike="noStrike">
               <a:solidFill>
                 <a:srgbClr val="000000"/>
               </a:solidFill>
@@ -7192,7 +7285,7 @@
         <p:spPr>
           <a:xfrm>
             <a:off x="5761440" y="472680"/>
-            <a:ext cx="3382200" cy="462960"/>
+            <a:ext cx="3381840" cy="462600"/>
           </a:xfrm>
           <a:prstGeom prst="rect">
             <a:avLst/>
@@ -7254,7 +7347,7 @@
         <p:spPr>
           <a:xfrm>
             <a:off x="6161760" y="1362240"/>
-            <a:ext cx="5182200" cy="3683520"/>
+            <a:ext cx="5181840" cy="3683160"/>
           </a:xfrm>
           <a:prstGeom prst="rect">
             <a:avLst/>
@@ -7280,7 +7373,7 @@
         <p:spPr>
           <a:xfrm>
             <a:off x="5760000" y="1152000"/>
-            <a:ext cx="6119640" cy="4356000"/>
+            <a:ext cx="6119280" cy="4355640"/>
           </a:xfrm>
           <a:prstGeom prst="rect">
             <a:avLst/>
@@ -7310,6 +7403,7 @@
                   </a:solidFill>
                 </a:uFill>
                 <a:latin typeface="Arial"/>
+                <a:ea typeface="DejaVu Sans"/>
               </a:rPr>
               <a:t>public String doCommand (PathContainer currentPathContainer, String input) {</a:t>
             </a:r>
@@ -7337,6 +7431,7 @@
                   </a:solidFill>
                 </a:uFill>
                 <a:latin typeface="Arial"/>
+                <a:ea typeface="DejaVu Sans"/>
               </a:rPr>
               <a:t>    </a:t>
             </a:r>
@@ -7351,6 +7446,7 @@
                   </a:solidFill>
                 </a:uFill>
                 <a:latin typeface="Arial"/>
+                <a:ea typeface="DejaVu Sans"/>
               </a:rPr>
               <a:t>boolean absolutePath = input.startsWith(PathContainer.DIR_SEPERATOR);</a:t>
             </a:r>
@@ -7378,6 +7474,7 @@
                   </a:solidFill>
                 </a:uFill>
                 <a:latin typeface="Arial"/>
+                <a:ea typeface="DejaVu Sans"/>
               </a:rPr>
               <a:t>    </a:t>
             </a:r>
@@ -7392,6 +7489,7 @@
                   </a:solidFill>
                 </a:uFill>
                 <a:latin typeface="Arial"/>
+                <a:ea typeface="DejaVu Sans"/>
               </a:rPr>
               <a:t>FSAdapter adapter = super.getAdapter();</a:t>
             </a:r>
@@ -7432,6 +7530,7 @@
                   </a:solidFill>
                 </a:uFill>
                 <a:latin typeface="Arial"/>
+                <a:ea typeface="DejaVu Sans"/>
               </a:rPr>
               <a:t>    </a:t>
             </a:r>
@@ -7446,6 +7545,7 @@
                   </a:solidFill>
                 </a:uFill>
                 <a:latin typeface="Arial"/>
+                <a:ea typeface="DejaVu Sans"/>
               </a:rPr>
               <a:t>if (absolutePath) {</a:t>
             </a:r>
@@ -7473,6 +7573,7 @@
                   </a:solidFill>
                 </a:uFill>
                 <a:latin typeface="Arial"/>
+                <a:ea typeface="DejaVu Sans"/>
               </a:rPr>
               <a:t>        </a:t>
             </a:r>
@@ -7487,6 +7588,7 @@
                   </a:solidFill>
                 </a:uFill>
                 <a:latin typeface="Arial"/>
+                <a:ea typeface="DejaVu Sans"/>
               </a:rPr>
               <a:t>if (adapter.isDir(input)) {</a:t>
             </a:r>
@@ -7514,6 +7616,7 @@
                   </a:solidFill>
                 </a:uFill>
                 <a:latin typeface="Arial"/>
+                <a:ea typeface="DejaVu Sans"/>
               </a:rPr>
               <a:t>            </a:t>
             </a:r>
@@ -7528,6 +7631,7 @@
                   </a:solidFill>
                 </a:uFill>
                 <a:latin typeface="Arial"/>
+                <a:ea typeface="DejaVu Sans"/>
               </a:rPr>
               <a:t>currentPathContainer.setPath(input);</a:t>
             </a:r>
@@ -7555,6 +7659,7 @@
                   </a:solidFill>
                 </a:uFill>
                 <a:latin typeface="Arial"/>
+                <a:ea typeface="DejaVu Sans"/>
               </a:rPr>
               <a:t>        </a:t>
             </a:r>
@@ -7569,6 +7674,7 @@
                   </a:solidFill>
                 </a:uFill>
                 <a:latin typeface="Arial"/>
+                <a:ea typeface="DejaVu Sans"/>
               </a:rPr>
               <a:t>} else {</a:t>
             </a:r>
@@ -7596,6 +7702,7 @@
                   </a:solidFill>
                 </a:uFill>
                 <a:latin typeface="Arial"/>
+                <a:ea typeface="DejaVu Sans"/>
               </a:rPr>
               <a:t>            </a:t>
             </a:r>
@@ -7610,6 +7717,7 @@
                   </a:solidFill>
                 </a:uFill>
                 <a:latin typeface="Arial"/>
+                <a:ea typeface="DejaVu Sans"/>
               </a:rPr>
               <a:t>return NO_SUCH_DIR_MSG;</a:t>
             </a:r>
@@ -7637,6 +7745,7 @@
                   </a:solidFill>
                 </a:uFill>
                 <a:latin typeface="Arial"/>
+                <a:ea typeface="DejaVu Sans"/>
               </a:rPr>
               <a:t>        </a:t>
             </a:r>
@@ -7651,6 +7760,7 @@
                   </a:solidFill>
                 </a:uFill>
                 <a:latin typeface="Arial"/>
+                <a:ea typeface="DejaVu Sans"/>
               </a:rPr>
               <a:t>}</a:t>
             </a:r>
@@ -7678,6 +7788,7 @@
                   </a:solidFill>
                 </a:uFill>
                 <a:latin typeface="Arial"/>
+                <a:ea typeface="DejaVu Sans"/>
               </a:rPr>
               <a:t>    </a:t>
             </a:r>
@@ -7692,6 +7803,7 @@
                   </a:solidFill>
                 </a:uFill>
                 <a:latin typeface="Arial"/>
+                <a:ea typeface="DejaVu Sans"/>
               </a:rPr>
               <a:t>} else {</a:t>
             </a:r>
@@ -7719,6 +7831,7 @@
                   </a:solidFill>
                 </a:uFill>
                 <a:latin typeface="Arial"/>
+                <a:ea typeface="DejaVu Sans"/>
               </a:rPr>
               <a:t>        </a:t>
             </a:r>
@@ -7733,6 +7846,7 @@
                   </a:solidFill>
                 </a:uFill>
                 <a:latin typeface="Arial"/>
+                <a:ea typeface="DejaVu Sans"/>
               </a:rPr>
               <a:t>String appended = currentPathContainer.getPath() +</a:t>
             </a:r>
@@ -7760,6 +7874,7 @@
                   </a:solidFill>
                 </a:uFill>
                 <a:latin typeface="Arial"/>
+                <a:ea typeface="DejaVu Sans"/>
               </a:rPr>
               <a:t>	</a:t>
             </a:r>
@@ -7774,6 +7889,7 @@
                   </a:solidFill>
                 </a:uFill>
                 <a:latin typeface="Arial"/>
+                <a:ea typeface="DejaVu Sans"/>
               </a:rPr>
               <a:t>	</a:t>
             </a:r>
@@ -7788,6 +7904,7 @@
                   </a:solidFill>
                 </a:uFill>
                 <a:latin typeface="Arial"/>
+                <a:ea typeface="DejaVu Sans"/>
               </a:rPr>
               <a:t>PathContainer.DIR_SEPERATOR + input;</a:t>
             </a:r>
@@ -7815,6 +7932,7 @@
                   </a:solidFill>
                 </a:uFill>
                 <a:latin typeface="Arial"/>
+                <a:ea typeface="DejaVu Sans"/>
               </a:rPr>
               <a:t>        </a:t>
             </a:r>
@@ -7829,6 +7947,7 @@
                   </a:solidFill>
                 </a:uFill>
                 <a:latin typeface="Arial"/>
+                <a:ea typeface="DejaVu Sans"/>
               </a:rPr>
               <a:t>if (adapter.isDir(appended)) {</a:t>
             </a:r>
@@ -7856,6 +7975,7 @@
                   </a:solidFill>
                 </a:uFill>
                 <a:latin typeface="Arial"/>
+                <a:ea typeface="DejaVu Sans"/>
               </a:rPr>
               <a:t>            </a:t>
             </a:r>
@@ -7870,6 +7990,7 @@
                   </a:solidFill>
                 </a:uFill>
                 <a:latin typeface="Arial"/>
+                <a:ea typeface="DejaVu Sans"/>
               </a:rPr>
               <a:t>currentPathContainer.setPath(appended);</a:t>
             </a:r>
@@ -7897,6 +8018,7 @@
                   </a:solidFill>
                 </a:uFill>
                 <a:latin typeface="Arial"/>
+                <a:ea typeface="DejaVu Sans"/>
               </a:rPr>
               <a:t>        </a:t>
             </a:r>
@@ -7911,6 +8033,7 @@
                   </a:solidFill>
                 </a:uFill>
                 <a:latin typeface="Arial"/>
+                <a:ea typeface="DejaVu Sans"/>
               </a:rPr>
               <a:t>} else if (input.equals("..")) {</a:t>
             </a:r>
@@ -7938,6 +8061,7 @@
                   </a:solidFill>
                 </a:uFill>
                 <a:latin typeface="Arial"/>
+                <a:ea typeface="DejaVu Sans"/>
               </a:rPr>
               <a:t>            </a:t>
             </a:r>
@@ -7952,6 +8076,7 @@
                   </a:solidFill>
                 </a:uFill>
                 <a:latin typeface="Arial"/>
+                <a:ea typeface="DejaVu Sans"/>
               </a:rPr>
               <a:t>currentPathContainer.setPath(currentPathContainer.getParentPath());</a:t>
             </a:r>
@@ -7979,6 +8104,7 @@
                   </a:solidFill>
                 </a:uFill>
                 <a:latin typeface="Arial"/>
+                <a:ea typeface="DejaVu Sans"/>
               </a:rPr>
               <a:t>        </a:t>
             </a:r>
@@ -7993,6 +8119,7 @@
                   </a:solidFill>
                 </a:uFill>
                 <a:latin typeface="Arial"/>
+                <a:ea typeface="DejaVu Sans"/>
               </a:rPr>
               <a:t>} else if (input.equals("")){</a:t>
             </a:r>
@@ -8020,6 +8147,7 @@
                   </a:solidFill>
                 </a:uFill>
                 <a:latin typeface="Arial"/>
+                <a:ea typeface="DejaVu Sans"/>
               </a:rPr>
               <a:t>            </a:t>
             </a:r>
@@ -8034,6 +8162,7 @@
                   </a:solidFill>
                 </a:uFill>
                 <a:latin typeface="Arial"/>
+                <a:ea typeface="DejaVu Sans"/>
               </a:rPr>
               <a:t>currentPathContainer.setPath("");</a:t>
             </a:r>
@@ -8061,6 +8190,7 @@
                   </a:solidFill>
                 </a:uFill>
                 <a:latin typeface="Arial"/>
+                <a:ea typeface="DejaVu Sans"/>
               </a:rPr>
               <a:t>        </a:t>
             </a:r>
@@ -8075,6 +8205,7 @@
                   </a:solidFill>
                 </a:uFill>
                 <a:latin typeface="Arial"/>
+                <a:ea typeface="DejaVu Sans"/>
               </a:rPr>
               <a:t>} else {</a:t>
             </a:r>
@@ -8102,6 +8233,7 @@
                   </a:solidFill>
                 </a:uFill>
                 <a:latin typeface="Arial"/>
+                <a:ea typeface="DejaVu Sans"/>
               </a:rPr>
               <a:t>            </a:t>
             </a:r>
@@ -8116,6 +8248,7 @@
                   </a:solidFill>
                 </a:uFill>
                 <a:latin typeface="Arial"/>
+                <a:ea typeface="DejaVu Sans"/>
               </a:rPr>
               <a:t>return NO_SUCH_DIR_MSG;</a:t>
             </a:r>
@@ -8143,6 +8276,7 @@
                   </a:solidFill>
                 </a:uFill>
                 <a:latin typeface="Arial"/>
+                <a:ea typeface="DejaVu Sans"/>
               </a:rPr>
               <a:t>        </a:t>
             </a:r>
@@ -8157,6 +8291,7 @@
                   </a:solidFill>
                 </a:uFill>
                 <a:latin typeface="Arial"/>
+                <a:ea typeface="DejaVu Sans"/>
               </a:rPr>
               <a:t>}</a:t>
             </a:r>
@@ -8184,6 +8319,7 @@
                   </a:solidFill>
                 </a:uFill>
                 <a:latin typeface="Arial"/>
+                <a:ea typeface="DejaVu Sans"/>
               </a:rPr>
               <a:t>    </a:t>
             </a:r>
@@ -8198,6 +8334,7 @@
                   </a:solidFill>
                 </a:uFill>
                 <a:latin typeface="Arial"/>
+                <a:ea typeface="DejaVu Sans"/>
               </a:rPr>
               <a:t>}</a:t>
             </a:r>
@@ -8225,6 +8362,7 @@
                   </a:solidFill>
                 </a:uFill>
                 <a:latin typeface="Arial"/>
+                <a:ea typeface="DejaVu Sans"/>
               </a:rPr>
               <a:t>    </a:t>
             </a:r>
@@ -8239,6 +8377,7 @@
                   </a:solidFill>
                 </a:uFill>
                 <a:latin typeface="Arial"/>
+                <a:ea typeface="DejaVu Sans"/>
               </a:rPr>
               <a:t>return "";</a:t>
             </a:r>
@@ -8266,6 +8405,7 @@
                   </a:solidFill>
                 </a:uFill>
                 <a:latin typeface="Arial"/>
+                <a:ea typeface="DejaVu Sans"/>
               </a:rPr>
               <a:t>}</a:t>
             </a:r>
@@ -8292,7 +8432,7 @@
         <p:spPr>
           <a:xfrm>
             <a:off x="360" y="6480360"/>
-            <a:ext cx="9243360" cy="369360"/>
+            <a:ext cx="9243000" cy="369000"/>
           </a:xfrm>
           <a:prstGeom prst="rect">
             <a:avLst/>
@@ -8322,6 +8462,7 @@
                   </a:solidFill>
                 </a:uFill>
                 <a:latin typeface="Arial"/>
+                <a:ea typeface="DejaVu Sans"/>
               </a:rPr>
               <a:t>https://github.com/Pontussand/INTE2016Project/commit/cc43857e69629f7bcb6a039665c428be9eb83eeb</a:t>
             </a:r>
@@ -8397,7 +8538,7 @@
         <p:spPr>
           <a:xfrm>
             <a:off x="838080" y="365040"/>
-            <a:ext cx="10514520" cy="1324440"/>
+            <a:ext cx="10514160" cy="1324080"/>
           </a:xfrm>
           <a:prstGeom prst="rect">
             <a:avLst/>
@@ -8459,7 +8600,7 @@
         <p:spPr>
           <a:xfrm>
             <a:off x="838080" y="1825560"/>
-            <a:ext cx="10514520" cy="4350240"/>
+            <a:ext cx="10514160" cy="4349880"/>
           </a:xfrm>
           <a:prstGeom prst="rect">
             <a:avLst/>
@@ -8478,14 +8619,14 @@
       </p:sp>
       <p:sp>
         <p:nvSpPr>
-          <p:cNvPr id="94" name="TextShape 3"/>
-          <p:cNvSpPr txBox="1"/>
+          <p:cNvPr id="94" name="CustomShape 3"/>
+          <p:cNvSpPr/>
           <p:nvPr/>
         </p:nvSpPr>
         <p:spPr>
           <a:xfrm>
             <a:off x="6480000" y="288000"/>
-            <a:ext cx="4848120" cy="1790280"/>
+            <a:ext cx="4847760" cy="1789920"/>
           </a:xfrm>
           <a:prstGeom prst="rect">
             <a:avLst/>
@@ -8495,6 +8636,12 @@
             <a:noFill/>
           </a:ln>
         </p:spPr>
+        <p:style>
+          <a:lnRef idx="0"/>
+          <a:fillRef idx="0"/>
+          <a:effectRef idx="0"/>
+          <a:fontRef idx="minor"/>
+        </p:style>
         <p:txBody>
           <a:bodyPr lIns="90000" rIns="90000" tIns="45000" bIns="45000"/>
           <a:p>
@@ -8541,14 +8688,14 @@
       </p:sp>
       <p:sp>
         <p:nvSpPr>
-          <p:cNvPr id="95" name="TextShape 4"/>
-          <p:cNvSpPr txBox="1"/>
+          <p:cNvPr id="95" name="CustomShape 4"/>
+          <p:cNvSpPr/>
           <p:nvPr/>
         </p:nvSpPr>
         <p:spPr>
           <a:xfrm>
             <a:off x="1008000" y="2016000"/>
-            <a:ext cx="8712000" cy="1986120"/>
+            <a:ext cx="8711640" cy="1985760"/>
           </a:xfrm>
           <a:prstGeom prst="rect">
             <a:avLst/>
@@ -8558,10 +8705,19 @@
             <a:noFill/>
           </a:ln>
         </p:spPr>
+        <p:style>
+          <a:lnRef idx="0"/>
+          <a:fillRef idx="0"/>
+          <a:effectRef idx="0"/>
+          <a:fontRef idx="minor"/>
+        </p:style>
         <p:txBody>
           <a:bodyPr lIns="90000" rIns="90000" tIns="45000" bIns="45000"/>
           <a:p>
-            <a:pPr marL="216000" indent="-216000">
+            <a:pPr marL="216000" indent="-215640">
+              <a:lnSpc>
+                <a:spcPct val="100000"/>
+              </a:lnSpc>
               <a:buClr>
                 <a:srgbClr val="000000"/>
               </a:buClr>
@@ -8596,7 +8752,10 @@
             </a:endParaRPr>
           </a:p>
           <a:p>
-            <a:pPr marL="216000" indent="-216000">
+            <a:pPr marL="216000" indent="-215640">
+              <a:lnSpc>
+                <a:spcPct val="100000"/>
+              </a:lnSpc>
               <a:buClr>
                 <a:srgbClr val="000000"/>
               </a:buClr>
@@ -8631,7 +8790,10 @@
             </a:endParaRPr>
           </a:p>
           <a:p>
-            <a:pPr marL="216000" indent="-216000">
+            <a:pPr marL="216000" indent="-215640">
+              <a:lnSpc>
+                <a:spcPct val="100000"/>
+              </a:lnSpc>
               <a:buClr>
                 <a:srgbClr val="000000"/>
               </a:buClr>

</xml_diff>